<commit_message>
updates the files for the project presentation
</commit_message>
<xml_diff>
--- a/MovieMood_Presentation.pptx
+++ b/MovieMood_Presentation.pptx
@@ -5,36 +5,36 @@
     <p:sldMasterId id="2147483648" r:id="rId1"/>
   </p:sldMasterIdLst>
   <p:sldIdLst>
-    <p:sldId id="256" r:id="rId7"/>
-    <p:sldId id="257" r:id="rId8"/>
-    <p:sldId id="258" r:id="rId9"/>
-    <p:sldId id="259" r:id="rId10"/>
-    <p:sldId id="260" r:id="rId11"/>
-    <p:sldId id="261" r:id="rId12"/>
-    <p:sldId id="262" r:id="rId13"/>
-    <p:sldId id="263" r:id="rId14"/>
-    <p:sldId id="264" r:id="rId15"/>
-    <p:sldId id="265" r:id="rId16"/>
-    <p:sldId id="266" r:id="rId17"/>
-    <p:sldId id="267" r:id="rId18"/>
-    <p:sldId id="268" r:id="rId19"/>
-    <p:sldId id="269" r:id="rId20"/>
-    <p:sldId id="270" r:id="rId21"/>
-    <p:sldId id="271" r:id="rId22"/>
-    <p:sldId id="272" r:id="rId23"/>
-    <p:sldId id="273" r:id="rId24"/>
-    <p:sldId id="274" r:id="rId25"/>
-    <p:sldId id="275" r:id="rId26"/>
-    <p:sldId id="276" r:id="rId27"/>
-    <p:sldId id="277" r:id="rId28"/>
-    <p:sldId id="278" r:id="rId29"/>
-    <p:sldId id="279" r:id="rId30"/>
-    <p:sldId id="280" r:id="rId31"/>
-    <p:sldId id="281" r:id="rId32"/>
-    <p:sldId id="282" r:id="rId33"/>
-    <p:sldId id="283" r:id="rId34"/>
-    <p:sldId id="284" r:id="rId35"/>
-    <p:sldId id="285" r:id="rId36"/>
+    <p:sldId id="256" r:id="rId2"/>
+    <p:sldId id="257" r:id="rId3"/>
+    <p:sldId id="258" r:id="rId4"/>
+    <p:sldId id="259" r:id="rId5"/>
+    <p:sldId id="260" r:id="rId6"/>
+    <p:sldId id="261" r:id="rId7"/>
+    <p:sldId id="262" r:id="rId8"/>
+    <p:sldId id="263" r:id="rId9"/>
+    <p:sldId id="264" r:id="rId10"/>
+    <p:sldId id="265" r:id="rId11"/>
+    <p:sldId id="266" r:id="rId12"/>
+    <p:sldId id="267" r:id="rId13"/>
+    <p:sldId id="268" r:id="rId14"/>
+    <p:sldId id="269" r:id="rId15"/>
+    <p:sldId id="270" r:id="rId16"/>
+    <p:sldId id="271" r:id="rId17"/>
+    <p:sldId id="272" r:id="rId18"/>
+    <p:sldId id="273" r:id="rId19"/>
+    <p:sldId id="274" r:id="rId20"/>
+    <p:sldId id="275" r:id="rId21"/>
+    <p:sldId id="276" r:id="rId22"/>
+    <p:sldId id="277" r:id="rId23"/>
+    <p:sldId id="278" r:id="rId24"/>
+    <p:sldId id="279" r:id="rId25"/>
+    <p:sldId id="280" r:id="rId26"/>
+    <p:sldId id="281" r:id="rId27"/>
+    <p:sldId id="282" r:id="rId28"/>
+    <p:sldId id="283" r:id="rId29"/>
+    <p:sldId id="284" r:id="rId30"/>
+    <p:sldId id="285" r:id="rId31"/>
   </p:sldIdLst>
   <p:sldSz cx="9144000" cy="6858000" type="screen4x3"/>
   <p:notesSz cx="6858000" cy="9144000"/>
@@ -133,6 +133,22 @@
       </a:defRPr>
     </a:lvl9pPr>
   </p:defaultTextStyle>
+  <p:extLst>
+    <p:ext uri="{EFAFB233-063F-42B5-8137-9DF3F51BA10A}">
+      <p15:sldGuideLst xmlns:p15="http://schemas.microsoft.com/office/powerpoint/2012/main">
+        <p15:guide id="1" orient="horz" pos="2160">
+          <p15:clr>
+            <a:srgbClr val="A4A3A4"/>
+          </p15:clr>
+        </p15:guide>
+        <p15:guide id="2" pos="2880">
+          <p15:clr>
+            <a:srgbClr val="A4A3A4"/>
+          </p15:clr>
+        </p15:guide>
+      </p15:sldGuideLst>
+    </p:ext>
+  </p:extLst>
 </p:presentation>
 </file>
 
@@ -174,10 +190,9 @@
           <a:lstStyle/>
           <a:p>
             <a:r>
-              <a:rPr lang="en-US" smtClean="0"/>
+              <a:rPr lang="en-US"/>
               <a:t>Click to edit Master title style</a:t>
             </a:r>
-            <a:endParaRPr lang="en-US"/>
           </a:p>
         </p:txBody>
       </p:sp>
@@ -293,10 +308,9 @@
           </a:lstStyle>
           <a:p>
             <a:r>
-              <a:rPr lang="en-US" smtClean="0"/>
+              <a:rPr lang="en-US"/>
               <a:t>Click to edit Master subtitle style</a:t>
             </a:r>
-            <a:endParaRPr lang="en-US"/>
           </a:p>
         </p:txBody>
       </p:sp>
@@ -317,7 +331,7 @@
           <a:p>
             <a:fld id="{5BCAD085-E8A6-8845-BD4E-CB4CCA059FC4}" type="datetimeFigureOut">
               <a:rPr lang="en-US" smtClean="0"/>
-              <a:t>1/27/13</a:t>
+              <a:t>12/4/2025</a:t>
             </a:fld>
             <a:endParaRPr lang="en-US"/>
           </a:p>
@@ -359,7 +373,7 @@
           <a:p>
             <a:fld id="{C1FF6DA9-008F-8B48-92A6-B652298478BF}" type="slidenum">
               <a:rPr lang="en-US" smtClean="0"/>
-              <a:t>‹#›</a:t>
+              <a:t>‹N°›</a:t>
             </a:fld>
             <a:endParaRPr lang="en-US"/>
           </a:p>
@@ -411,10 +425,9 @@
           <a:lstStyle/>
           <a:p>
             <a:r>
-              <a:rPr lang="en-US" smtClean="0"/>
+              <a:rPr lang="en-US"/>
               <a:t>Click to edit Master title style</a:t>
             </a:r>
-            <a:endParaRPr lang="en-US"/>
           </a:p>
         </p:txBody>
       </p:sp>
@@ -435,38 +448,37 @@
           <a:p>
             <a:pPr lvl="0"/>
             <a:r>
-              <a:rPr lang="en-US" smtClean="0"/>
+              <a:rPr lang="en-US"/>
               <a:t>Click to edit Master text styles</a:t>
             </a:r>
           </a:p>
           <a:p>
             <a:pPr lvl="1"/>
             <a:r>
-              <a:rPr lang="en-US" smtClean="0"/>
+              <a:rPr lang="en-US"/>
               <a:t>Second level</a:t>
             </a:r>
           </a:p>
           <a:p>
             <a:pPr lvl="2"/>
             <a:r>
-              <a:rPr lang="en-US" smtClean="0"/>
+              <a:rPr lang="en-US"/>
               <a:t>Third level</a:t>
             </a:r>
           </a:p>
           <a:p>
             <a:pPr lvl="3"/>
             <a:r>
-              <a:rPr lang="en-US" smtClean="0"/>
+              <a:rPr lang="en-US"/>
               <a:t>Fourth level</a:t>
             </a:r>
           </a:p>
           <a:p>
             <a:pPr lvl="4"/>
             <a:r>
-              <a:rPr lang="en-US" smtClean="0"/>
+              <a:rPr lang="en-US"/>
               <a:t>Fifth level</a:t>
             </a:r>
-            <a:endParaRPr lang="en-US"/>
           </a:p>
         </p:txBody>
       </p:sp>
@@ -487,7 +499,7 @@
           <a:p>
             <a:fld id="{5BCAD085-E8A6-8845-BD4E-CB4CCA059FC4}" type="datetimeFigureOut">
               <a:rPr lang="en-US" smtClean="0"/>
-              <a:t>1/27/13</a:t>
+              <a:t>12/4/2025</a:t>
             </a:fld>
             <a:endParaRPr lang="en-US"/>
           </a:p>
@@ -529,7 +541,7 @@
           <a:p>
             <a:fld id="{C1FF6DA9-008F-8B48-92A6-B652298478BF}" type="slidenum">
               <a:rPr lang="en-US" smtClean="0"/>
-              <a:t>‹#›</a:t>
+              <a:t>‹N°›</a:t>
             </a:fld>
             <a:endParaRPr lang="en-US"/>
           </a:p>
@@ -586,10 +598,9 @@
           <a:lstStyle/>
           <a:p>
             <a:r>
-              <a:rPr lang="en-US" smtClean="0"/>
+              <a:rPr lang="en-US"/>
               <a:t>Click to edit Master title style</a:t>
             </a:r>
-            <a:endParaRPr lang="en-US"/>
           </a:p>
         </p:txBody>
       </p:sp>
@@ -615,38 +626,37 @@
           <a:p>
             <a:pPr lvl="0"/>
             <a:r>
-              <a:rPr lang="en-US" smtClean="0"/>
+              <a:rPr lang="en-US"/>
               <a:t>Click to edit Master text styles</a:t>
             </a:r>
           </a:p>
           <a:p>
             <a:pPr lvl="1"/>
             <a:r>
-              <a:rPr lang="en-US" smtClean="0"/>
+              <a:rPr lang="en-US"/>
               <a:t>Second level</a:t>
             </a:r>
           </a:p>
           <a:p>
             <a:pPr lvl="2"/>
             <a:r>
-              <a:rPr lang="en-US" smtClean="0"/>
+              <a:rPr lang="en-US"/>
               <a:t>Third level</a:t>
             </a:r>
           </a:p>
           <a:p>
             <a:pPr lvl="3"/>
             <a:r>
-              <a:rPr lang="en-US" smtClean="0"/>
+              <a:rPr lang="en-US"/>
               <a:t>Fourth level</a:t>
             </a:r>
           </a:p>
           <a:p>
             <a:pPr lvl="4"/>
             <a:r>
-              <a:rPr lang="en-US" smtClean="0"/>
+              <a:rPr lang="en-US"/>
               <a:t>Fifth level</a:t>
             </a:r>
-            <a:endParaRPr lang="en-US"/>
           </a:p>
         </p:txBody>
       </p:sp>
@@ -667,7 +677,7 @@
           <a:p>
             <a:fld id="{5BCAD085-E8A6-8845-BD4E-CB4CCA059FC4}" type="datetimeFigureOut">
               <a:rPr lang="en-US" smtClean="0"/>
-              <a:t>1/27/13</a:t>
+              <a:t>12/4/2025</a:t>
             </a:fld>
             <a:endParaRPr lang="en-US"/>
           </a:p>
@@ -709,7 +719,7 @@
           <a:p>
             <a:fld id="{C1FF6DA9-008F-8B48-92A6-B652298478BF}" type="slidenum">
               <a:rPr lang="en-US" smtClean="0"/>
-              <a:t>‹#›</a:t>
+              <a:t>‹N°›</a:t>
             </a:fld>
             <a:endParaRPr lang="en-US"/>
           </a:p>
@@ -761,10 +771,9 @@
           <a:lstStyle/>
           <a:p>
             <a:r>
-              <a:rPr lang="en-US" smtClean="0"/>
+              <a:rPr lang="en-US"/>
               <a:t>Click to edit Master title style</a:t>
             </a:r>
-            <a:endParaRPr lang="en-US"/>
           </a:p>
         </p:txBody>
       </p:sp>
@@ -785,38 +794,37 @@
           <a:p>
             <a:pPr lvl="0"/>
             <a:r>
-              <a:rPr lang="en-US" smtClean="0"/>
+              <a:rPr lang="en-US"/>
               <a:t>Click to edit Master text styles</a:t>
             </a:r>
           </a:p>
           <a:p>
             <a:pPr lvl="1"/>
             <a:r>
-              <a:rPr lang="en-US" smtClean="0"/>
+              <a:rPr lang="en-US"/>
               <a:t>Second level</a:t>
             </a:r>
           </a:p>
           <a:p>
             <a:pPr lvl="2"/>
             <a:r>
-              <a:rPr lang="en-US" smtClean="0"/>
+              <a:rPr lang="en-US"/>
               <a:t>Third level</a:t>
             </a:r>
           </a:p>
           <a:p>
             <a:pPr lvl="3"/>
             <a:r>
-              <a:rPr lang="en-US" smtClean="0"/>
+              <a:rPr lang="en-US"/>
               <a:t>Fourth level</a:t>
             </a:r>
           </a:p>
           <a:p>
             <a:pPr lvl="4"/>
             <a:r>
-              <a:rPr lang="en-US" smtClean="0"/>
+              <a:rPr lang="en-US"/>
               <a:t>Fifth level</a:t>
             </a:r>
-            <a:endParaRPr lang="en-US"/>
           </a:p>
         </p:txBody>
       </p:sp>
@@ -837,7 +845,7 @@
           <a:p>
             <a:fld id="{5BCAD085-E8A6-8845-BD4E-CB4CCA059FC4}" type="datetimeFigureOut">
               <a:rPr lang="en-US" smtClean="0"/>
-              <a:t>1/27/13</a:t>
+              <a:t>12/4/2025</a:t>
             </a:fld>
             <a:endParaRPr lang="en-US"/>
           </a:p>
@@ -879,7 +887,7 @@
           <a:p>
             <a:fld id="{C1FF6DA9-008F-8B48-92A6-B652298478BF}" type="slidenum">
               <a:rPr lang="en-US" smtClean="0"/>
-              <a:t>‹#›</a:t>
+              <a:t>‹N°›</a:t>
             </a:fld>
             <a:endParaRPr lang="en-US"/>
           </a:p>
@@ -940,10 +948,9 @@
           </a:lstStyle>
           <a:p>
             <a:r>
-              <a:rPr lang="en-US" smtClean="0"/>
+              <a:rPr lang="en-US"/>
               <a:t>Click to edit Master title style</a:t>
             </a:r>
-            <a:endParaRPr lang="en-US"/>
           </a:p>
         </p:txBody>
       </p:sp>
@@ -1060,7 +1067,7 @@
           <a:p>
             <a:pPr lvl="0"/>
             <a:r>
-              <a:rPr lang="en-US" smtClean="0"/>
+              <a:rPr lang="en-US"/>
               <a:t>Click to edit Master text styles</a:t>
             </a:r>
           </a:p>
@@ -1083,7 +1090,7 @@
           <a:p>
             <a:fld id="{5BCAD085-E8A6-8845-BD4E-CB4CCA059FC4}" type="datetimeFigureOut">
               <a:rPr lang="en-US" smtClean="0"/>
-              <a:t>1/27/13</a:t>
+              <a:t>12/4/2025</a:t>
             </a:fld>
             <a:endParaRPr lang="en-US"/>
           </a:p>
@@ -1125,7 +1132,7 @@
           <a:p>
             <a:fld id="{C1FF6DA9-008F-8B48-92A6-B652298478BF}" type="slidenum">
               <a:rPr lang="en-US" smtClean="0"/>
-              <a:t>‹#›</a:t>
+              <a:t>‹N°›</a:t>
             </a:fld>
             <a:endParaRPr lang="en-US"/>
           </a:p>
@@ -1177,10 +1184,9 @@
           <a:lstStyle/>
           <a:p>
             <a:r>
-              <a:rPr lang="en-US" smtClean="0"/>
+              <a:rPr lang="en-US"/>
               <a:t>Click to edit Master title style</a:t>
             </a:r>
-            <a:endParaRPr lang="en-US"/>
           </a:p>
         </p:txBody>
       </p:sp>
@@ -1234,38 +1240,37 @@
           <a:p>
             <a:pPr lvl="0"/>
             <a:r>
-              <a:rPr lang="en-US" smtClean="0"/>
+              <a:rPr lang="en-US"/>
               <a:t>Click to edit Master text styles</a:t>
             </a:r>
           </a:p>
           <a:p>
             <a:pPr lvl="1"/>
             <a:r>
-              <a:rPr lang="en-US" smtClean="0"/>
+              <a:rPr lang="en-US"/>
               <a:t>Second level</a:t>
             </a:r>
           </a:p>
           <a:p>
             <a:pPr lvl="2"/>
             <a:r>
-              <a:rPr lang="en-US" smtClean="0"/>
+              <a:rPr lang="en-US"/>
               <a:t>Third level</a:t>
             </a:r>
           </a:p>
           <a:p>
             <a:pPr lvl="3"/>
             <a:r>
-              <a:rPr lang="en-US" smtClean="0"/>
+              <a:rPr lang="en-US"/>
               <a:t>Fourth level</a:t>
             </a:r>
           </a:p>
           <a:p>
             <a:pPr lvl="4"/>
             <a:r>
-              <a:rPr lang="en-US" smtClean="0"/>
+              <a:rPr lang="en-US"/>
               <a:t>Fifth level</a:t>
             </a:r>
-            <a:endParaRPr lang="en-US"/>
           </a:p>
         </p:txBody>
       </p:sp>
@@ -1319,38 +1324,37 @@
           <a:p>
             <a:pPr lvl="0"/>
             <a:r>
-              <a:rPr lang="en-US" smtClean="0"/>
+              <a:rPr lang="en-US"/>
               <a:t>Click to edit Master text styles</a:t>
             </a:r>
           </a:p>
           <a:p>
             <a:pPr lvl="1"/>
             <a:r>
-              <a:rPr lang="en-US" smtClean="0"/>
+              <a:rPr lang="en-US"/>
               <a:t>Second level</a:t>
             </a:r>
           </a:p>
           <a:p>
             <a:pPr lvl="2"/>
             <a:r>
-              <a:rPr lang="en-US" smtClean="0"/>
+              <a:rPr lang="en-US"/>
               <a:t>Third level</a:t>
             </a:r>
           </a:p>
           <a:p>
             <a:pPr lvl="3"/>
             <a:r>
-              <a:rPr lang="en-US" smtClean="0"/>
+              <a:rPr lang="en-US"/>
               <a:t>Fourth level</a:t>
             </a:r>
           </a:p>
           <a:p>
             <a:pPr lvl="4"/>
             <a:r>
-              <a:rPr lang="en-US" smtClean="0"/>
+              <a:rPr lang="en-US"/>
               <a:t>Fifth level</a:t>
             </a:r>
-            <a:endParaRPr lang="en-US"/>
           </a:p>
         </p:txBody>
       </p:sp>
@@ -1371,7 +1375,7 @@
           <a:p>
             <a:fld id="{5BCAD085-E8A6-8845-BD4E-CB4CCA059FC4}" type="datetimeFigureOut">
               <a:rPr lang="en-US" smtClean="0"/>
-              <a:t>1/27/13</a:t>
+              <a:t>12/4/2025</a:t>
             </a:fld>
             <a:endParaRPr lang="en-US"/>
           </a:p>
@@ -1413,7 +1417,7 @@
           <a:p>
             <a:fld id="{C1FF6DA9-008F-8B48-92A6-B652298478BF}" type="slidenum">
               <a:rPr lang="en-US" smtClean="0"/>
-              <a:t>‹#›</a:t>
+              <a:t>‹N°›</a:t>
             </a:fld>
             <a:endParaRPr lang="en-US"/>
           </a:p>
@@ -1469,10 +1473,9 @@
           </a:lstStyle>
           <a:p>
             <a:r>
-              <a:rPr lang="en-US" smtClean="0"/>
+              <a:rPr lang="en-US"/>
               <a:t>Click to edit Master title style</a:t>
             </a:r>
-            <a:endParaRPr lang="en-US"/>
           </a:p>
         </p:txBody>
       </p:sp>
@@ -1535,7 +1538,7 @@
           <a:p>
             <a:pPr lvl="0"/>
             <a:r>
-              <a:rPr lang="en-US" smtClean="0"/>
+              <a:rPr lang="en-US"/>
               <a:t>Click to edit Master text styles</a:t>
             </a:r>
           </a:p>
@@ -1591,38 +1594,37 @@
           <a:p>
             <a:pPr lvl="0"/>
             <a:r>
-              <a:rPr lang="en-US" smtClean="0"/>
+              <a:rPr lang="en-US"/>
               <a:t>Click to edit Master text styles</a:t>
             </a:r>
           </a:p>
           <a:p>
             <a:pPr lvl="1"/>
             <a:r>
-              <a:rPr lang="en-US" smtClean="0"/>
+              <a:rPr lang="en-US"/>
               <a:t>Second level</a:t>
             </a:r>
           </a:p>
           <a:p>
             <a:pPr lvl="2"/>
             <a:r>
-              <a:rPr lang="en-US" smtClean="0"/>
+              <a:rPr lang="en-US"/>
               <a:t>Third level</a:t>
             </a:r>
           </a:p>
           <a:p>
             <a:pPr lvl="3"/>
             <a:r>
-              <a:rPr lang="en-US" smtClean="0"/>
+              <a:rPr lang="en-US"/>
               <a:t>Fourth level</a:t>
             </a:r>
           </a:p>
           <a:p>
             <a:pPr lvl="4"/>
             <a:r>
-              <a:rPr lang="en-US" smtClean="0"/>
+              <a:rPr lang="en-US"/>
               <a:t>Fifth level</a:t>
             </a:r>
-            <a:endParaRPr lang="en-US"/>
           </a:p>
         </p:txBody>
       </p:sp>
@@ -1685,7 +1687,7 @@
           <a:p>
             <a:pPr lvl="0"/>
             <a:r>
-              <a:rPr lang="en-US" smtClean="0"/>
+              <a:rPr lang="en-US"/>
               <a:t>Click to edit Master text styles</a:t>
             </a:r>
           </a:p>
@@ -1741,38 +1743,37 @@
           <a:p>
             <a:pPr lvl="0"/>
             <a:r>
-              <a:rPr lang="en-US" smtClean="0"/>
+              <a:rPr lang="en-US"/>
               <a:t>Click to edit Master text styles</a:t>
             </a:r>
           </a:p>
           <a:p>
             <a:pPr lvl="1"/>
             <a:r>
-              <a:rPr lang="en-US" smtClean="0"/>
+              <a:rPr lang="en-US"/>
               <a:t>Second level</a:t>
             </a:r>
           </a:p>
           <a:p>
             <a:pPr lvl="2"/>
             <a:r>
-              <a:rPr lang="en-US" smtClean="0"/>
+              <a:rPr lang="en-US"/>
               <a:t>Third level</a:t>
             </a:r>
           </a:p>
           <a:p>
             <a:pPr lvl="3"/>
             <a:r>
-              <a:rPr lang="en-US" smtClean="0"/>
+              <a:rPr lang="en-US"/>
               <a:t>Fourth level</a:t>
             </a:r>
           </a:p>
           <a:p>
             <a:pPr lvl="4"/>
             <a:r>
-              <a:rPr lang="en-US" smtClean="0"/>
+              <a:rPr lang="en-US"/>
               <a:t>Fifth level</a:t>
             </a:r>
-            <a:endParaRPr lang="en-US"/>
           </a:p>
         </p:txBody>
       </p:sp>
@@ -1793,7 +1794,7 @@
           <a:p>
             <a:fld id="{5BCAD085-E8A6-8845-BD4E-CB4CCA059FC4}" type="datetimeFigureOut">
               <a:rPr lang="en-US" smtClean="0"/>
-              <a:t>1/27/13</a:t>
+              <a:t>12/4/2025</a:t>
             </a:fld>
             <a:endParaRPr lang="en-US"/>
           </a:p>
@@ -1835,7 +1836,7 @@
           <a:p>
             <a:fld id="{C1FF6DA9-008F-8B48-92A6-B652298478BF}" type="slidenum">
               <a:rPr lang="en-US" smtClean="0"/>
-              <a:t>‹#›</a:t>
+              <a:t>‹N°›</a:t>
             </a:fld>
             <a:endParaRPr lang="en-US"/>
           </a:p>
@@ -1887,10 +1888,9 @@
           <a:lstStyle/>
           <a:p>
             <a:r>
-              <a:rPr lang="en-US" smtClean="0"/>
+              <a:rPr lang="en-US"/>
               <a:t>Click to edit Master title style</a:t>
             </a:r>
-            <a:endParaRPr lang="en-US"/>
           </a:p>
         </p:txBody>
       </p:sp>
@@ -1911,7 +1911,7 @@
           <a:p>
             <a:fld id="{5BCAD085-E8A6-8845-BD4E-CB4CCA059FC4}" type="datetimeFigureOut">
               <a:rPr lang="en-US" smtClean="0"/>
-              <a:t>1/27/13</a:t>
+              <a:t>12/4/2025</a:t>
             </a:fld>
             <a:endParaRPr lang="en-US"/>
           </a:p>
@@ -1953,7 +1953,7 @@
           <a:p>
             <a:fld id="{C1FF6DA9-008F-8B48-92A6-B652298478BF}" type="slidenum">
               <a:rPr lang="en-US" smtClean="0"/>
-              <a:t>‹#›</a:t>
+              <a:t>‹N°›</a:t>
             </a:fld>
             <a:endParaRPr lang="en-US"/>
           </a:p>
@@ -2006,7 +2006,7 @@
           <a:p>
             <a:fld id="{5BCAD085-E8A6-8845-BD4E-CB4CCA059FC4}" type="datetimeFigureOut">
               <a:rPr lang="en-US" smtClean="0"/>
-              <a:t>1/27/13</a:t>
+              <a:t>12/4/2025</a:t>
             </a:fld>
             <a:endParaRPr lang="en-US"/>
           </a:p>
@@ -2048,7 +2048,7 @@
           <a:p>
             <a:fld id="{C1FF6DA9-008F-8B48-92A6-B652298478BF}" type="slidenum">
               <a:rPr lang="en-US" smtClean="0"/>
-              <a:t>‹#›</a:t>
+              <a:t>‹N°›</a:t>
             </a:fld>
             <a:endParaRPr lang="en-US"/>
           </a:p>
@@ -2109,10 +2109,9 @@
           </a:lstStyle>
           <a:p>
             <a:r>
-              <a:rPr lang="en-US" smtClean="0"/>
+              <a:rPr lang="en-US"/>
               <a:t>Click to edit Master title style</a:t>
             </a:r>
-            <a:endParaRPr lang="en-US"/>
           </a:p>
         </p:txBody>
       </p:sp>
@@ -2166,38 +2165,37 @@
           <a:p>
             <a:pPr lvl="0"/>
             <a:r>
-              <a:rPr lang="en-US" smtClean="0"/>
+              <a:rPr lang="en-US"/>
               <a:t>Click to edit Master text styles</a:t>
             </a:r>
           </a:p>
           <a:p>
             <a:pPr lvl="1"/>
             <a:r>
-              <a:rPr lang="en-US" smtClean="0"/>
+              <a:rPr lang="en-US"/>
               <a:t>Second level</a:t>
             </a:r>
           </a:p>
           <a:p>
             <a:pPr lvl="2"/>
             <a:r>
-              <a:rPr lang="en-US" smtClean="0"/>
+              <a:rPr lang="en-US"/>
               <a:t>Third level</a:t>
             </a:r>
           </a:p>
           <a:p>
             <a:pPr lvl="3"/>
             <a:r>
-              <a:rPr lang="en-US" smtClean="0"/>
+              <a:rPr lang="en-US"/>
               <a:t>Fourth level</a:t>
             </a:r>
           </a:p>
           <a:p>
             <a:pPr lvl="4"/>
             <a:r>
-              <a:rPr lang="en-US" smtClean="0"/>
+              <a:rPr lang="en-US"/>
               <a:t>Fifth level</a:t>
             </a:r>
-            <a:endParaRPr lang="en-US"/>
           </a:p>
         </p:txBody>
       </p:sp>
@@ -2260,7 +2258,7 @@
           <a:p>
             <a:pPr lvl="0"/>
             <a:r>
-              <a:rPr lang="en-US" smtClean="0"/>
+              <a:rPr lang="en-US"/>
               <a:t>Click to edit Master text styles</a:t>
             </a:r>
           </a:p>
@@ -2283,7 +2281,7 @@
           <a:p>
             <a:fld id="{5BCAD085-E8A6-8845-BD4E-CB4CCA059FC4}" type="datetimeFigureOut">
               <a:rPr lang="en-US" smtClean="0"/>
-              <a:t>1/27/13</a:t>
+              <a:t>12/4/2025</a:t>
             </a:fld>
             <a:endParaRPr lang="en-US"/>
           </a:p>
@@ -2325,7 +2323,7 @@
           <a:p>
             <a:fld id="{C1FF6DA9-008F-8B48-92A6-B652298478BF}" type="slidenum">
               <a:rPr lang="en-US" smtClean="0"/>
-              <a:t>‹#›</a:t>
+              <a:t>‹N°›</a:t>
             </a:fld>
             <a:endParaRPr lang="en-US"/>
           </a:p>
@@ -2386,10 +2384,9 @@
           </a:lstStyle>
           <a:p>
             <a:r>
-              <a:rPr lang="en-US" smtClean="0"/>
+              <a:rPr lang="en-US"/>
               <a:t>Click to edit Master title style</a:t>
             </a:r>
-            <a:endParaRPr lang="en-US"/>
           </a:p>
         </p:txBody>
       </p:sp>
@@ -2513,7 +2510,7 @@
           <a:p>
             <a:pPr lvl="0"/>
             <a:r>
-              <a:rPr lang="en-US" smtClean="0"/>
+              <a:rPr lang="en-US"/>
               <a:t>Click to edit Master text styles</a:t>
             </a:r>
           </a:p>
@@ -2536,7 +2533,7 @@
           <a:p>
             <a:fld id="{5BCAD085-E8A6-8845-BD4E-CB4CCA059FC4}" type="datetimeFigureOut">
               <a:rPr lang="en-US" smtClean="0"/>
-              <a:t>1/27/13</a:t>
+              <a:t>12/4/2025</a:t>
             </a:fld>
             <a:endParaRPr lang="en-US"/>
           </a:p>
@@ -2578,7 +2575,7 @@
           <a:p>
             <a:fld id="{C1FF6DA9-008F-8B48-92A6-B652298478BF}" type="slidenum">
               <a:rPr lang="en-US" smtClean="0"/>
-              <a:t>‹#›</a:t>
+              <a:t>‹N°›</a:t>
             </a:fld>
             <a:endParaRPr lang="en-US"/>
           </a:p>
@@ -2645,10 +2642,9 @@
           <a:lstStyle/>
           <a:p>
             <a:r>
-              <a:rPr lang="en-US" smtClean="0"/>
+              <a:rPr lang="en-US"/>
               <a:t>Click to edit Master title style</a:t>
             </a:r>
-            <a:endParaRPr lang="en-US"/>
           </a:p>
         </p:txBody>
       </p:sp>
@@ -2679,38 +2675,37 @@
           <a:p>
             <a:pPr lvl="0"/>
             <a:r>
-              <a:rPr lang="en-US" smtClean="0"/>
+              <a:rPr lang="en-US"/>
               <a:t>Click to edit Master text styles</a:t>
             </a:r>
           </a:p>
           <a:p>
             <a:pPr lvl="1"/>
             <a:r>
-              <a:rPr lang="en-US" smtClean="0"/>
+              <a:rPr lang="en-US"/>
               <a:t>Second level</a:t>
             </a:r>
           </a:p>
           <a:p>
             <a:pPr lvl="2"/>
             <a:r>
-              <a:rPr lang="en-US" smtClean="0"/>
+              <a:rPr lang="en-US"/>
               <a:t>Third level</a:t>
             </a:r>
           </a:p>
           <a:p>
             <a:pPr lvl="3"/>
             <a:r>
-              <a:rPr lang="en-US" smtClean="0"/>
+              <a:rPr lang="en-US"/>
               <a:t>Fourth level</a:t>
             </a:r>
           </a:p>
           <a:p>
             <a:pPr lvl="4"/>
             <a:r>
-              <a:rPr lang="en-US" smtClean="0"/>
+              <a:rPr lang="en-US"/>
               <a:t>Fifth level</a:t>
             </a:r>
-            <a:endParaRPr lang="en-US"/>
           </a:p>
         </p:txBody>
       </p:sp>
@@ -2749,7 +2744,7 @@
           <a:p>
             <a:fld id="{5BCAD085-E8A6-8845-BD4E-CB4CCA059FC4}" type="datetimeFigureOut">
               <a:rPr lang="en-US" smtClean="0"/>
-              <a:t>1/27/13</a:t>
+              <a:t>12/4/2025</a:t>
             </a:fld>
             <a:endParaRPr lang="en-US"/>
           </a:p>
@@ -2827,7 +2822,7 @@
           <a:p>
             <a:fld id="{C1FF6DA9-008F-8B48-92A6-B652298478BF}" type="slidenum">
               <a:rPr lang="en-US" smtClean="0"/>
-              <a:t>‹#›</a:t>
+              <a:t>‹N°›</a:t>
             </a:fld>
             <a:endParaRPr lang="en-US"/>
           </a:p>
@@ -3108,7 +3103,7 @@
 </file>
 
 <file path=ppt/slides/slide1.xml><?xml version="1.0" encoding="utf-8"?>
-<p:sld xmlns:a="http://schemas.openxmlformats.org/drawingml/2006/main" xmlns:p="http://schemas.openxmlformats.org/presentationml/2006/main" xmlns:r="http://schemas.openxmlformats.org/officeDocument/2006/relationships">
+<p:sld xmlns:a="http://schemas.openxmlformats.org/drawingml/2006/main" xmlns:r="http://schemas.openxmlformats.org/officeDocument/2006/relationships" xmlns:p="http://schemas.openxmlformats.org/presentationml/2006/main">
   <p:cSld>
     <p:bg>
       <p:bgPr>
@@ -3124,7 +3119,14 @@
         <p:cNvGrpSpPr/>
         <p:nvPr/>
       </p:nvGrpSpPr>
-      <p:grpSpPr/>
+      <p:grpSpPr>
+        <a:xfrm>
+          <a:off x="0" y="0"/>
+          <a:ext cx="0" cy="0"/>
+          <a:chOff x="0" y="0"/>
+          <a:chExt cx="0" cy="0"/>
+        </a:xfrm>
+      </p:grpSpPr>
       <p:sp>
         <p:nvSpPr>
           <p:cNvPr id="2" name="TextBox 1"/>
@@ -3155,8 +3157,14 @@
               </a:defRPr>
             </a:pPr>
             <a:r>
-              <a:t>🎬 MovieMood</a:t>
-            </a:r>
+              <a:rPr dirty="0"/>
+              <a:t>🎬 </a:t>
+            </a:r>
+            <a:r>
+              <a:rPr dirty="0" err="1"/>
+              <a:t>MovieMood</a:t>
+            </a:r>
+            <a:endParaRPr dirty="0"/>
           </a:p>
         </p:txBody>
       </p:sp>
@@ -3203,8 +3211,8 @@
         </p:nvSpPr>
         <p:spPr>
           <a:xfrm>
-            <a:off x="914400" y="4572000"/>
-            <a:ext cx="7315200" cy="1371600"/>
+            <a:off x="1501063" y="4572000"/>
+            <a:ext cx="6141874" cy="1200329"/>
           </a:xfrm>
           <a:prstGeom prst="rect">
             <a:avLst/>
@@ -3225,18 +3233,83 @@
               </a:defRPr>
             </a:pPr>
             <a:r>
+              <a:rPr dirty="0"/>
               <a:t>Équipe :</a:t>
             </a:r>
           </a:p>
           <a:p>
             <a:r>
-              <a:t>Gémima ONDELE POURU | Fatoumata BAH | Hector KOMBOU</a:t>
-            </a:r>
-          </a:p>
-          <a:p/>
-          <a:p>
-            <a:r>
-              <a:t>Projet Académique - Data Engineering</a:t>
+              <a:rPr dirty="0">
+                <a:solidFill>
+                  <a:schemeClr val="bg1"/>
+                </a:solidFill>
+              </a:rPr>
+              <a:t>Gémima ONDELE </a:t>
+            </a:r>
+            <a:r>
+              <a:rPr lang="fr-FR" dirty="0">
+                <a:solidFill>
+                  <a:schemeClr val="bg1"/>
+                </a:solidFill>
+              </a:rPr>
+              <a:t>POUROU</a:t>
+            </a:r>
+            <a:r>
+              <a:rPr dirty="0">
+                <a:solidFill>
+                  <a:schemeClr val="bg1"/>
+                </a:solidFill>
+              </a:rPr>
+              <a:t> | Fatoumata BAH | Hector KOMBOU</a:t>
+            </a:r>
+          </a:p>
+          <a:p>
+            <a:endParaRPr dirty="0">
+              <a:solidFill>
+                <a:schemeClr val="bg1"/>
+              </a:solidFill>
+            </a:endParaRPr>
+          </a:p>
+          <a:p>
+            <a:r>
+              <a:rPr dirty="0">
+                <a:solidFill>
+                  <a:schemeClr val="bg1"/>
+                </a:solidFill>
+              </a:rPr>
+              <a:t>Projet Académique </a:t>
+            </a:r>
+            <a:r>
+              <a:rPr lang="fr-FR" dirty="0">
+                <a:solidFill>
+                  <a:schemeClr val="bg1"/>
+                </a:solidFill>
+              </a:rPr>
+              <a:t>–</a:t>
+            </a:r>
+            <a:r>
+              <a:rPr dirty="0">
+                <a:solidFill>
+                  <a:schemeClr val="bg1"/>
+                </a:solidFill>
+              </a:rPr>
+              <a:t> </a:t>
+            </a:r>
+            <a:r>
+              <a:rPr lang="fr-FR" dirty="0">
+                <a:solidFill>
+                  <a:schemeClr val="bg1"/>
+                </a:solidFill>
+              </a:rPr>
+              <a:t>M1 </a:t>
+            </a:r>
+            <a:r>
+              <a:rPr dirty="0">
+                <a:solidFill>
+                  <a:schemeClr val="bg1"/>
+                </a:solidFill>
+              </a:rPr>
+              <a:t>Data Engineering</a:t>
             </a:r>
           </a:p>
         </p:txBody>
@@ -3250,7 +3323,7 @@
 </file>
 
 <file path=ppt/slides/slide10.xml><?xml version="1.0" encoding="utf-8"?>
-<p:sld xmlns:a="http://schemas.openxmlformats.org/drawingml/2006/main" xmlns:p="http://schemas.openxmlformats.org/presentationml/2006/main" xmlns:r="http://schemas.openxmlformats.org/officeDocument/2006/relationships">
+<p:sld xmlns:a="http://schemas.openxmlformats.org/drawingml/2006/main" xmlns:r="http://schemas.openxmlformats.org/officeDocument/2006/relationships" xmlns:p="http://schemas.openxmlformats.org/presentationml/2006/main">
   <p:cSld>
     <p:spTree>
       <p:nvGrpSpPr>
@@ -3258,7 +3331,14 @@
         <p:cNvGrpSpPr/>
         <p:nvPr/>
       </p:nvGrpSpPr>
-      <p:grpSpPr/>
+      <p:grpSpPr>
+        <a:xfrm>
+          <a:off x="0" y="0"/>
+          <a:ext cx="0" cy="0"/>
+          <a:chOff x="0" y="0"/>
+          <a:chExt cx="0" cy="0"/>
+        </a:xfrm>
+      </p:grpSpPr>
       <p:sp>
         <p:nvSpPr>
           <p:cNvPr id="2" name="Title 1"/>
@@ -3386,7 +3466,7 @@
 </file>
 
 <file path=ppt/slides/slide11.xml><?xml version="1.0" encoding="utf-8"?>
-<p:sld xmlns:a="http://schemas.openxmlformats.org/drawingml/2006/main" xmlns:p="http://schemas.openxmlformats.org/presentationml/2006/main" xmlns:r="http://schemas.openxmlformats.org/officeDocument/2006/relationships">
+<p:sld xmlns:a="http://schemas.openxmlformats.org/drawingml/2006/main" xmlns:r="http://schemas.openxmlformats.org/officeDocument/2006/relationships" xmlns:p="http://schemas.openxmlformats.org/presentationml/2006/main">
   <p:cSld>
     <p:spTree>
       <p:nvGrpSpPr>
@@ -3394,7 +3474,14 @@
         <p:cNvGrpSpPr/>
         <p:nvPr/>
       </p:nvGrpSpPr>
-      <p:grpSpPr/>
+      <p:grpSpPr>
+        <a:xfrm>
+          <a:off x="0" y="0"/>
+          <a:ext cx="0" cy="0"/>
+          <a:chOff x="0" y="0"/>
+          <a:chExt cx="0" cy="0"/>
+        </a:xfrm>
+      </p:grpSpPr>
       <p:sp>
         <p:nvSpPr>
           <p:cNvPr id="2" name="Title 1"/>
@@ -3407,7 +3494,9 @@
         </p:nvSpPr>
         <p:spPr/>
         <p:txBody>
-          <a:bodyPr/>
+          <a:bodyPr>
+            <a:normAutofit fontScale="90000"/>
+          </a:bodyPr>
           <a:lstStyle/>
           <a:p>
             <a:pPr>
@@ -3455,9 +3544,6 @@
           </a:p>
           <a:p>
             <a:br/>
-            <a:pPr>
-              <a:defRPr sz="1600" b="1"/>
-            </a:pPr>
             <a:r>
               <a:t>💡 RÉPONSE :</a:t>
             </a:r>
@@ -3497,7 +3583,7 @@
 </file>
 
 <file path=ppt/slides/slide12.xml><?xml version="1.0" encoding="utf-8"?>
-<p:sld xmlns:a="http://schemas.openxmlformats.org/drawingml/2006/main" xmlns:p="http://schemas.openxmlformats.org/presentationml/2006/main" xmlns:r="http://schemas.openxmlformats.org/officeDocument/2006/relationships">
+<p:sld xmlns:a="http://schemas.openxmlformats.org/drawingml/2006/main" xmlns:r="http://schemas.openxmlformats.org/officeDocument/2006/relationships" xmlns:p="http://schemas.openxmlformats.org/presentationml/2006/main">
   <p:cSld>
     <p:spTree>
       <p:nvGrpSpPr>
@@ -3505,7 +3591,14 @@
         <p:cNvGrpSpPr/>
         <p:nvPr/>
       </p:nvGrpSpPr>
-      <p:grpSpPr/>
+      <p:grpSpPr>
+        <a:xfrm>
+          <a:off x="0" y="0"/>
+          <a:ext cx="0" cy="0"/>
+          <a:chOff x="0" y="0"/>
+          <a:chExt cx="0" cy="0"/>
+        </a:xfrm>
+      </p:grpSpPr>
       <p:sp>
         <p:nvSpPr>
           <p:cNvPr id="2" name="Title 1"/>
@@ -3650,7 +3743,7 @@
 </file>
 
 <file path=ppt/slides/slide13.xml><?xml version="1.0" encoding="utf-8"?>
-<p:sld xmlns:a="http://schemas.openxmlformats.org/drawingml/2006/main" xmlns:p="http://schemas.openxmlformats.org/presentationml/2006/main" xmlns:r="http://schemas.openxmlformats.org/officeDocument/2006/relationships">
+<p:sld xmlns:a="http://schemas.openxmlformats.org/drawingml/2006/main" xmlns:r="http://schemas.openxmlformats.org/officeDocument/2006/relationships" xmlns:p="http://schemas.openxmlformats.org/presentationml/2006/main">
   <p:cSld>
     <p:spTree>
       <p:nvGrpSpPr>
@@ -3658,7 +3751,14 @@
         <p:cNvGrpSpPr/>
         <p:nvPr/>
       </p:nvGrpSpPr>
-      <p:grpSpPr/>
+      <p:grpSpPr>
+        <a:xfrm>
+          <a:off x="0" y="0"/>
+          <a:ext cx="0" cy="0"/>
+          <a:chOff x="0" y="0"/>
+          <a:chExt cx="0" cy="0"/>
+        </a:xfrm>
+      </p:grpSpPr>
       <p:sp>
         <p:nvSpPr>
           <p:cNvPr id="2" name="Title 1"/>
@@ -3719,9 +3819,6 @@
           </a:p>
           <a:p>
             <a:br/>
-            <a:pPr>
-              <a:defRPr sz="1600" b="1"/>
-            </a:pPr>
             <a:r>
               <a:t>💡 RÉPONSE :</a:t>
             </a:r>
@@ -3769,7 +3866,7 @@
 </file>
 
 <file path=ppt/slides/slide14.xml><?xml version="1.0" encoding="utf-8"?>
-<p:sld xmlns:a="http://schemas.openxmlformats.org/drawingml/2006/main" xmlns:p="http://schemas.openxmlformats.org/presentationml/2006/main" xmlns:r="http://schemas.openxmlformats.org/officeDocument/2006/relationships">
+<p:sld xmlns:a="http://schemas.openxmlformats.org/drawingml/2006/main" xmlns:r="http://schemas.openxmlformats.org/officeDocument/2006/relationships" xmlns:p="http://schemas.openxmlformats.org/presentationml/2006/main">
   <p:cSld>
     <p:spTree>
       <p:nvGrpSpPr>
@@ -3777,7 +3874,14 @@
         <p:cNvGrpSpPr/>
         <p:nvPr/>
       </p:nvGrpSpPr>
-      <p:grpSpPr/>
+      <p:grpSpPr>
+        <a:xfrm>
+          <a:off x="0" y="0"/>
+          <a:ext cx="0" cy="0"/>
+          <a:chOff x="0" y="0"/>
+          <a:chExt cx="0" cy="0"/>
+        </a:xfrm>
+      </p:grpSpPr>
       <p:sp>
         <p:nvSpPr>
           <p:cNvPr id="2" name="Title 1"/>
@@ -3921,7 +4025,7 @@
 </file>
 
 <file path=ppt/slides/slide15.xml><?xml version="1.0" encoding="utf-8"?>
-<p:sld xmlns:a="http://schemas.openxmlformats.org/drawingml/2006/main" xmlns:p="http://schemas.openxmlformats.org/presentationml/2006/main" xmlns:r="http://schemas.openxmlformats.org/officeDocument/2006/relationships">
+<p:sld xmlns:a="http://schemas.openxmlformats.org/drawingml/2006/main" xmlns:r="http://schemas.openxmlformats.org/officeDocument/2006/relationships" xmlns:p="http://schemas.openxmlformats.org/presentationml/2006/main">
   <p:cSld>
     <p:spTree>
       <p:nvGrpSpPr>
@@ -3929,7 +4033,14 @@
         <p:cNvGrpSpPr/>
         <p:nvPr/>
       </p:nvGrpSpPr>
-      <p:grpSpPr/>
+      <p:grpSpPr>
+        <a:xfrm>
+          <a:off x="0" y="0"/>
+          <a:ext cx="0" cy="0"/>
+          <a:chOff x="0" y="0"/>
+          <a:chExt cx="0" cy="0"/>
+        </a:xfrm>
+      </p:grpSpPr>
       <p:sp>
         <p:nvSpPr>
           <p:cNvPr id="2" name="Title 1"/>
@@ -3990,9 +4101,6 @@
           </a:p>
           <a:p>
             <a:br/>
-            <a:pPr>
-              <a:defRPr sz="1600" b="1"/>
-            </a:pPr>
             <a:r>
               <a:t>💡 RÉPONSE :</a:t>
             </a:r>
@@ -4032,7 +4140,7 @@
 </file>
 
 <file path=ppt/slides/slide16.xml><?xml version="1.0" encoding="utf-8"?>
-<p:sld xmlns:a="http://schemas.openxmlformats.org/drawingml/2006/main" xmlns:p="http://schemas.openxmlformats.org/presentationml/2006/main" xmlns:r="http://schemas.openxmlformats.org/officeDocument/2006/relationships">
+<p:sld xmlns:a="http://schemas.openxmlformats.org/drawingml/2006/main" xmlns:r="http://schemas.openxmlformats.org/officeDocument/2006/relationships" xmlns:p="http://schemas.openxmlformats.org/presentationml/2006/main">
   <p:cSld>
     <p:spTree>
       <p:nvGrpSpPr>
@@ -4040,7 +4148,14 @@
         <p:cNvGrpSpPr/>
         <p:nvPr/>
       </p:nvGrpSpPr>
-      <p:grpSpPr/>
+      <p:grpSpPr>
+        <a:xfrm>
+          <a:off x="0" y="0"/>
+          <a:ext cx="0" cy="0"/>
+          <a:chOff x="0" y="0"/>
+          <a:chExt cx="0" cy="0"/>
+        </a:xfrm>
+      </p:grpSpPr>
       <p:sp>
         <p:nvSpPr>
           <p:cNvPr id="2" name="Title 1"/>
@@ -4205,7 +4320,7 @@
 </file>
 
 <file path=ppt/slides/slide17.xml><?xml version="1.0" encoding="utf-8"?>
-<p:sld xmlns:a="http://schemas.openxmlformats.org/drawingml/2006/main" xmlns:p="http://schemas.openxmlformats.org/presentationml/2006/main" xmlns:r="http://schemas.openxmlformats.org/officeDocument/2006/relationships">
+<p:sld xmlns:a="http://schemas.openxmlformats.org/drawingml/2006/main" xmlns:r="http://schemas.openxmlformats.org/officeDocument/2006/relationships" xmlns:p="http://schemas.openxmlformats.org/presentationml/2006/main">
   <p:cSld>
     <p:spTree>
       <p:nvGrpSpPr>
@@ -4213,7 +4328,14 @@
         <p:cNvGrpSpPr/>
         <p:nvPr/>
       </p:nvGrpSpPr>
-      <p:grpSpPr/>
+      <p:grpSpPr>
+        <a:xfrm>
+          <a:off x="0" y="0"/>
+          <a:ext cx="0" cy="0"/>
+          <a:chOff x="0" y="0"/>
+          <a:chExt cx="0" cy="0"/>
+        </a:xfrm>
+      </p:grpSpPr>
       <p:sp>
         <p:nvSpPr>
           <p:cNvPr id="2" name="Title 1"/>
@@ -4274,9 +4396,6 @@
           </a:p>
           <a:p>
             <a:br/>
-            <a:pPr>
-              <a:defRPr sz="1600" b="1"/>
-            </a:pPr>
             <a:r>
               <a:t>💡 RÉPONSE :</a:t>
             </a:r>
@@ -4316,7 +4435,7 @@
 </file>
 
 <file path=ppt/slides/slide18.xml><?xml version="1.0" encoding="utf-8"?>
-<p:sld xmlns:a="http://schemas.openxmlformats.org/drawingml/2006/main" xmlns:p="http://schemas.openxmlformats.org/presentationml/2006/main" xmlns:r="http://schemas.openxmlformats.org/officeDocument/2006/relationships">
+<p:sld xmlns:a="http://schemas.openxmlformats.org/drawingml/2006/main" xmlns:r="http://schemas.openxmlformats.org/officeDocument/2006/relationships" xmlns:p="http://schemas.openxmlformats.org/presentationml/2006/main">
   <p:cSld>
     <p:spTree>
       <p:nvGrpSpPr>
@@ -4324,7 +4443,14 @@
         <p:cNvGrpSpPr/>
         <p:nvPr/>
       </p:nvGrpSpPr>
-      <p:grpSpPr/>
+      <p:grpSpPr>
+        <a:xfrm>
+          <a:off x="0" y="0"/>
+          <a:ext cx="0" cy="0"/>
+          <a:chOff x="0" y="0"/>
+          <a:chExt cx="0" cy="0"/>
+        </a:xfrm>
+      </p:grpSpPr>
       <p:sp>
         <p:nvSpPr>
           <p:cNvPr id="2" name="Title 1"/>
@@ -4441,7 +4567,7 @@
 </file>
 
 <file path=ppt/slides/slide19.xml><?xml version="1.0" encoding="utf-8"?>
-<p:sld xmlns:a="http://schemas.openxmlformats.org/drawingml/2006/main" xmlns:p="http://schemas.openxmlformats.org/presentationml/2006/main" xmlns:r="http://schemas.openxmlformats.org/officeDocument/2006/relationships">
+<p:sld xmlns:a="http://schemas.openxmlformats.org/drawingml/2006/main" xmlns:r="http://schemas.openxmlformats.org/officeDocument/2006/relationships" xmlns:p="http://schemas.openxmlformats.org/presentationml/2006/main">
   <p:cSld>
     <p:spTree>
       <p:nvGrpSpPr>
@@ -4449,7 +4575,14 @@
         <p:cNvGrpSpPr/>
         <p:nvPr/>
       </p:nvGrpSpPr>
-      <p:grpSpPr/>
+      <p:grpSpPr>
+        <a:xfrm>
+          <a:off x="0" y="0"/>
+          <a:ext cx="0" cy="0"/>
+          <a:chOff x="0" y="0"/>
+          <a:chExt cx="0" cy="0"/>
+        </a:xfrm>
+      </p:grpSpPr>
       <p:sp>
         <p:nvSpPr>
           <p:cNvPr id="2" name="Title 1"/>
@@ -4510,9 +4643,6 @@
           </a:p>
           <a:p>
             <a:br/>
-            <a:pPr>
-              <a:defRPr sz="1600" b="1"/>
-            </a:pPr>
             <a:r>
               <a:t>💡 RÉPONSE :</a:t>
             </a:r>
@@ -4552,7 +4682,7 @@
 </file>
 
 <file path=ppt/slides/slide2.xml><?xml version="1.0" encoding="utf-8"?>
-<p:sld xmlns:a="http://schemas.openxmlformats.org/drawingml/2006/main" xmlns:p="http://schemas.openxmlformats.org/presentationml/2006/main" xmlns:r="http://schemas.openxmlformats.org/officeDocument/2006/relationships">
+<p:sld xmlns:a="http://schemas.openxmlformats.org/drawingml/2006/main" xmlns:r="http://schemas.openxmlformats.org/officeDocument/2006/relationships" xmlns:p="http://schemas.openxmlformats.org/presentationml/2006/main">
   <p:cSld>
     <p:spTree>
       <p:nvGrpSpPr>
@@ -4560,7 +4690,14 @@
         <p:cNvGrpSpPr/>
         <p:nvPr/>
       </p:nvGrpSpPr>
-      <p:grpSpPr/>
+      <p:grpSpPr>
+        <a:xfrm>
+          <a:off x="0" y="0"/>
+          <a:ext cx="0" cy="0"/>
+          <a:chOff x="0" y="0"/>
+          <a:chExt cx="0" cy="0"/>
+        </a:xfrm>
+      </p:grpSpPr>
       <p:sp>
         <p:nvSpPr>
           <p:cNvPr id="2" name="Title 1"/>
@@ -4601,7 +4738,9 @@
         </p:nvSpPr>
         <p:spPr/>
         <p:txBody>
-          <a:bodyPr/>
+          <a:bodyPr>
+            <a:normAutofit lnSpcReduction="10000"/>
+          </a:bodyPr>
           <a:lstStyle/>
           <a:p>
             <a:pPr>
@@ -4621,9 +4760,6 @@
           </a:p>
           <a:p>
             <a:br/>
-            <a:pPr>
-              <a:defRPr sz="2000" b="1"/>
-            </a:pPr>
             <a:r>
               <a:t>Notre Solution : 🎯</a:t>
             </a:r>
@@ -4662,9 +4798,6 @@
           </a:p>
           <a:p>
             <a:br/>
-            <a:pPr>
-              <a:defRPr sz="2000" b="1"/>
-            </a:pPr>
             <a:r>
               <a:t>Impact : ✅</a:t>
             </a:r>
@@ -4704,7 +4837,7 @@
 </file>
 
 <file path=ppt/slides/slide20.xml><?xml version="1.0" encoding="utf-8"?>
-<p:sld xmlns:a="http://schemas.openxmlformats.org/drawingml/2006/main" xmlns:p="http://schemas.openxmlformats.org/presentationml/2006/main" xmlns:r="http://schemas.openxmlformats.org/officeDocument/2006/relationships">
+<p:sld xmlns:a="http://schemas.openxmlformats.org/drawingml/2006/main" xmlns:r="http://schemas.openxmlformats.org/officeDocument/2006/relationships" xmlns:p="http://schemas.openxmlformats.org/presentationml/2006/main">
   <p:cSld>
     <p:spTree>
       <p:nvGrpSpPr>
@@ -4712,7 +4845,14 @@
         <p:cNvGrpSpPr/>
         <p:nvPr/>
       </p:nvGrpSpPr>
-      <p:grpSpPr/>
+      <p:grpSpPr>
+        <a:xfrm>
+          <a:off x="0" y="0"/>
+          <a:ext cx="0" cy="0"/>
+          <a:chOff x="0" y="0"/>
+          <a:chExt cx="0" cy="0"/>
+        </a:xfrm>
+      </p:grpSpPr>
       <p:sp>
         <p:nvSpPr>
           <p:cNvPr id="2" name="Title 1"/>
@@ -4865,7 +5005,7 @@
 </file>
 
 <file path=ppt/slides/slide21.xml><?xml version="1.0" encoding="utf-8"?>
-<p:sld xmlns:a="http://schemas.openxmlformats.org/drawingml/2006/main" xmlns:p="http://schemas.openxmlformats.org/presentationml/2006/main" xmlns:r="http://schemas.openxmlformats.org/officeDocument/2006/relationships">
+<p:sld xmlns:a="http://schemas.openxmlformats.org/drawingml/2006/main" xmlns:r="http://schemas.openxmlformats.org/officeDocument/2006/relationships" xmlns:p="http://schemas.openxmlformats.org/presentationml/2006/main">
   <p:cSld>
     <p:spTree>
       <p:nvGrpSpPr>
@@ -4873,7 +5013,14 @@
         <p:cNvGrpSpPr/>
         <p:nvPr/>
       </p:nvGrpSpPr>
-      <p:grpSpPr/>
+      <p:grpSpPr>
+        <a:xfrm>
+          <a:off x="0" y="0"/>
+          <a:ext cx="0" cy="0"/>
+          <a:chOff x="0" y="0"/>
+          <a:chExt cx="0" cy="0"/>
+        </a:xfrm>
+      </p:grpSpPr>
       <p:sp>
         <p:nvSpPr>
           <p:cNvPr id="2" name="Title 1"/>
@@ -4934,9 +5081,6 @@
           </a:p>
           <a:p>
             <a:br/>
-            <a:pPr>
-              <a:defRPr sz="1600" b="1"/>
-            </a:pPr>
             <a:r>
               <a:t>💡 RÉPONSE :</a:t>
             </a:r>
@@ -4992,7 +5136,7 @@
 </file>
 
 <file path=ppt/slides/slide22.xml><?xml version="1.0" encoding="utf-8"?>
-<p:sld xmlns:a="http://schemas.openxmlformats.org/drawingml/2006/main" xmlns:p="http://schemas.openxmlformats.org/presentationml/2006/main" xmlns:r="http://schemas.openxmlformats.org/officeDocument/2006/relationships">
+<p:sld xmlns:a="http://schemas.openxmlformats.org/drawingml/2006/main" xmlns:r="http://schemas.openxmlformats.org/officeDocument/2006/relationships" xmlns:p="http://schemas.openxmlformats.org/presentationml/2006/main">
   <p:cSld>
     <p:spTree>
       <p:nvGrpSpPr>
@@ -5000,7 +5144,14 @@
         <p:cNvGrpSpPr/>
         <p:nvPr/>
       </p:nvGrpSpPr>
-      <p:grpSpPr/>
+      <p:grpSpPr>
+        <a:xfrm>
+          <a:off x="0" y="0"/>
+          <a:ext cx="0" cy="0"/>
+          <a:chOff x="0" y="0"/>
+          <a:chExt cx="0" cy="0"/>
+        </a:xfrm>
+      </p:grpSpPr>
       <p:sp>
         <p:nvSpPr>
           <p:cNvPr id="2" name="Title 1"/>
@@ -5094,7 +5245,7 @@
 </file>
 
 <file path=ppt/slides/slide23.xml><?xml version="1.0" encoding="utf-8"?>
-<p:sld xmlns:a="http://schemas.openxmlformats.org/drawingml/2006/main" xmlns:p="http://schemas.openxmlformats.org/presentationml/2006/main" xmlns:r="http://schemas.openxmlformats.org/officeDocument/2006/relationships">
+<p:sld xmlns:a="http://schemas.openxmlformats.org/drawingml/2006/main" xmlns:r="http://schemas.openxmlformats.org/officeDocument/2006/relationships" xmlns:p="http://schemas.openxmlformats.org/presentationml/2006/main">
   <p:cSld>
     <p:spTree>
       <p:nvGrpSpPr>
@@ -5102,7 +5253,14 @@
         <p:cNvGrpSpPr/>
         <p:nvPr/>
       </p:nvGrpSpPr>
-      <p:grpSpPr/>
+      <p:grpSpPr>
+        <a:xfrm>
+          <a:off x="0" y="0"/>
+          <a:ext cx="0" cy="0"/>
+          <a:chOff x="0" y="0"/>
+          <a:chExt cx="0" cy="0"/>
+        </a:xfrm>
+      </p:grpSpPr>
       <p:sp>
         <p:nvSpPr>
           <p:cNvPr id="2" name="Title 1"/>
@@ -5155,9 +5313,6 @@
           </a:p>
           <a:p>
             <a:br/>
-            <a:pPr lvl="1">
-              <a:defRPr sz="1600" b="1"/>
-            </a:pPr>
             <a:r>
               <a:t>✅ Dataset :</a:t>
             </a:r>
@@ -5188,9 +5343,6 @@
           </a:p>
           <a:p>
             <a:br/>
-            <a:pPr lvl="1">
-              <a:defRPr sz="1600" b="1"/>
-            </a:pPr>
             <a:r>
               <a:t>✅ Système de Recommandation :</a:t>
             </a:r>
@@ -5230,7 +5382,7 @@
 </file>
 
 <file path=ppt/slides/slide24.xml><?xml version="1.0" encoding="utf-8"?>
-<p:sld xmlns:a="http://schemas.openxmlformats.org/drawingml/2006/main" xmlns:p="http://schemas.openxmlformats.org/presentationml/2006/main" xmlns:r="http://schemas.openxmlformats.org/officeDocument/2006/relationships">
+<p:sld xmlns:a="http://schemas.openxmlformats.org/drawingml/2006/main" xmlns:r="http://schemas.openxmlformats.org/officeDocument/2006/relationships" xmlns:p="http://schemas.openxmlformats.org/presentationml/2006/main">
   <p:cSld>
     <p:spTree>
       <p:nvGrpSpPr>
@@ -5238,7 +5390,14 @@
         <p:cNvGrpSpPr/>
         <p:nvPr/>
       </p:nvGrpSpPr>
-      <p:grpSpPr/>
+      <p:grpSpPr>
+        <a:xfrm>
+          <a:off x="0" y="0"/>
+          <a:ext cx="0" cy="0"/>
+          <a:chOff x="0" y="0"/>
+          <a:chExt cx="0" cy="0"/>
+        </a:xfrm>
+      </p:grpSpPr>
       <p:sp>
         <p:nvSpPr>
           <p:cNvPr id="2" name="Title 1"/>
@@ -5279,7 +5438,9 @@
         </p:nvSpPr>
         <p:spPr/>
         <p:txBody>
-          <a:bodyPr/>
+          <a:bodyPr>
+            <a:normAutofit lnSpcReduction="10000"/>
+          </a:bodyPr>
           <a:lstStyle/>
           <a:p>
             <a:pPr>
@@ -5299,9 +5460,6 @@
           </a:p>
           <a:p>
             <a:br/>
-            <a:pPr>
-              <a:defRPr sz="1600" b="1"/>
-            </a:pPr>
             <a:r>
               <a:t>2. Recommandation par émotion</a:t>
             </a:r>
@@ -5316,9 +5474,6 @@
           </a:p>
           <a:p>
             <a:br/>
-            <a:pPr>
-              <a:defRPr sz="1600" b="1"/>
-            </a:pPr>
             <a:r>
               <a:t>3. Détection faciale (bonus)</a:t>
             </a:r>
@@ -5333,9 +5488,6 @@
           </a:p>
           <a:p>
             <a:br/>
-            <a:pPr>
-              <a:defRPr sz="1600" b="1"/>
-            </a:pPr>
             <a:r>
               <a:t>4. Vidéo de fond</a:t>
             </a:r>
@@ -5359,7 +5511,7 @@
 </file>
 
 <file path=ppt/slides/slide25.xml><?xml version="1.0" encoding="utf-8"?>
-<p:sld xmlns:a="http://schemas.openxmlformats.org/drawingml/2006/main" xmlns:p="http://schemas.openxmlformats.org/presentationml/2006/main" xmlns:r="http://schemas.openxmlformats.org/officeDocument/2006/relationships">
+<p:sld xmlns:a="http://schemas.openxmlformats.org/drawingml/2006/main" xmlns:r="http://schemas.openxmlformats.org/officeDocument/2006/relationships" xmlns:p="http://schemas.openxmlformats.org/presentationml/2006/main">
   <p:cSld>
     <p:spTree>
       <p:nvGrpSpPr>
@@ -5367,7 +5519,14 @@
         <p:cNvGrpSpPr/>
         <p:nvPr/>
       </p:nvGrpSpPr>
-      <p:grpSpPr/>
+      <p:grpSpPr>
+        <a:xfrm>
+          <a:off x="0" y="0"/>
+          <a:ext cx="0" cy="0"/>
+          <a:chOff x="0" y="0"/>
+          <a:chExt cx="0" cy="0"/>
+        </a:xfrm>
+      </p:grpSpPr>
       <p:sp>
         <p:nvSpPr>
           <p:cNvPr id="2" name="Title 1"/>
@@ -5408,7 +5567,9 @@
         </p:nvSpPr>
         <p:spPr/>
         <p:txBody>
-          <a:bodyPr/>
+          <a:bodyPr>
+            <a:normAutofit fontScale="85000" lnSpcReduction="10000"/>
+          </a:bodyPr>
           <a:lstStyle/>
           <a:p>
             <a:pPr>
@@ -5420,45 +5581,30 @@
           </a:p>
           <a:p>
             <a:br/>
-            <a:pPr lvl="1">
-              <a:defRPr sz="1400"/>
-            </a:pPr>
             <a:r>
               <a:t>Back-end : Python 3.12, Flask, Pandas</a:t>
             </a:r>
           </a:p>
           <a:p>
             <a:br/>
-            <a:pPr lvl="1">
-              <a:defRPr sz="1400"/>
-            </a:pPr>
             <a:r>
               <a:t>IA &amp; ML : TextBlob, DeepFace, TensorFlow, OpenCV</a:t>
             </a:r>
           </a:p>
           <a:p>
             <a:br/>
-            <a:pPr lvl="1">
-              <a:defRPr sz="1400"/>
-            </a:pPr>
             <a:r>
               <a:t>Front-end : HTML5, CSS3, JavaScript, YouTube API</a:t>
             </a:r>
           </a:p>
           <a:p>
             <a:br/>
-            <a:pPr lvl="1">
-              <a:defRPr sz="1400"/>
-            </a:pPr>
             <a:r>
               <a:t>Données : TMDB (4,803 films), Cache JSON</a:t>
             </a:r>
           </a:p>
           <a:p>
             <a:br/>
-            <a:pPr lvl="1">
-              <a:defRPr sz="1400"/>
-            </a:pPr>
             <a:r>
               <a:t>Évaluation : Jupyter, Matplotlib, Seaborn</a:t>
             </a:r>
@@ -5474,7 +5620,7 @@
 </file>
 
 <file path=ppt/slides/slide26.xml><?xml version="1.0" encoding="utf-8"?>
-<p:sld xmlns:a="http://schemas.openxmlformats.org/drawingml/2006/main" xmlns:p="http://schemas.openxmlformats.org/presentationml/2006/main" xmlns:r="http://schemas.openxmlformats.org/officeDocument/2006/relationships">
+<p:sld xmlns:a="http://schemas.openxmlformats.org/drawingml/2006/main" xmlns:r="http://schemas.openxmlformats.org/officeDocument/2006/relationships" xmlns:p="http://schemas.openxmlformats.org/presentationml/2006/main">
   <p:cSld>
     <p:spTree>
       <p:nvGrpSpPr>
@@ -5482,7 +5628,14 @@
         <p:cNvGrpSpPr/>
         <p:nvPr/>
       </p:nvGrpSpPr>
-      <p:grpSpPr/>
+      <p:grpSpPr>
+        <a:xfrm>
+          <a:off x="0" y="0"/>
+          <a:ext cx="0" cy="0"/>
+          <a:chOff x="0" y="0"/>
+          <a:chExt cx="0" cy="0"/>
+        </a:xfrm>
+      </p:grpSpPr>
       <p:sp>
         <p:nvSpPr>
           <p:cNvPr id="2" name="Title 1"/>
@@ -5584,7 +5737,7 @@
 </file>
 
 <file path=ppt/slides/slide27.xml><?xml version="1.0" encoding="utf-8"?>
-<p:sld xmlns:a="http://schemas.openxmlformats.org/drawingml/2006/main" xmlns:p="http://schemas.openxmlformats.org/presentationml/2006/main" xmlns:r="http://schemas.openxmlformats.org/officeDocument/2006/relationships">
+<p:sld xmlns:a="http://schemas.openxmlformats.org/drawingml/2006/main" xmlns:r="http://schemas.openxmlformats.org/officeDocument/2006/relationships" xmlns:p="http://schemas.openxmlformats.org/presentationml/2006/main">
   <p:cSld>
     <p:spTree>
       <p:nvGrpSpPr>
@@ -5592,7 +5745,14 @@
         <p:cNvGrpSpPr/>
         <p:nvPr/>
       </p:nvGrpSpPr>
-      <p:grpSpPr/>
+      <p:grpSpPr>
+        <a:xfrm>
+          <a:off x="0" y="0"/>
+          <a:ext cx="0" cy="0"/>
+          <a:chOff x="0" y="0"/>
+          <a:chExt cx="0" cy="0"/>
+        </a:xfrm>
+      </p:grpSpPr>
       <p:sp>
         <p:nvSpPr>
           <p:cNvPr id="2" name="Title 1"/>
@@ -5633,7 +5793,9 @@
         </p:nvSpPr>
         <p:spPr/>
         <p:txBody>
-          <a:bodyPr/>
+          <a:bodyPr>
+            <a:normAutofit fontScale="92500" lnSpcReduction="20000"/>
+          </a:bodyPr>
           <a:lstStyle/>
           <a:p>
             <a:pPr>
@@ -5645,9 +5807,6 @@
           </a:p>
           <a:p>
             <a:br/>
-            <a:pPr lvl="1">
-              <a:defRPr sz="1600" b="1"/>
-            </a:pPr>
             <a:r>
               <a:t>Court terme :</a:t>
             </a:r>
@@ -5678,9 +5837,6 @@
           </a:p>
           <a:p>
             <a:br/>
-            <a:pPr lvl="1">
-              <a:defRPr sz="1600" b="1"/>
-            </a:pPr>
             <a:r>
               <a:t>Moyen terme :</a:t>
             </a:r>
@@ -5703,9 +5859,6 @@
           </a:p>
           <a:p>
             <a:br/>
-            <a:pPr lvl="1">
-              <a:defRPr sz="1600" b="1"/>
-            </a:pPr>
             <a:r>
               <a:t>Long terme :</a:t>
             </a:r>
@@ -5737,7 +5890,7 @@
 </file>
 
 <file path=ppt/slides/slide28.xml><?xml version="1.0" encoding="utf-8"?>
-<p:sld xmlns:a="http://schemas.openxmlformats.org/drawingml/2006/main" xmlns:p="http://schemas.openxmlformats.org/presentationml/2006/main" xmlns:r="http://schemas.openxmlformats.org/officeDocument/2006/relationships">
+<p:sld xmlns:a="http://schemas.openxmlformats.org/drawingml/2006/main" xmlns:r="http://schemas.openxmlformats.org/officeDocument/2006/relationships" xmlns:p="http://schemas.openxmlformats.org/presentationml/2006/main">
   <p:cSld>
     <p:spTree>
       <p:nvGrpSpPr>
@@ -5745,7 +5898,14 @@
         <p:cNvGrpSpPr/>
         <p:nvPr/>
       </p:nvGrpSpPr>
-      <p:grpSpPr/>
+      <p:grpSpPr>
+        <a:xfrm>
+          <a:off x="0" y="0"/>
+          <a:ext cx="0" cy="0"/>
+          <a:chOff x="0" y="0"/>
+          <a:chExt cx="0" cy="0"/>
+        </a:xfrm>
+      </p:grpSpPr>
       <p:sp>
         <p:nvSpPr>
           <p:cNvPr id="2" name="Title 1"/>
@@ -5846,9 +6006,6 @@
           </a:p>
           <a:p>
             <a:br/>
-            <a:pPr>
-              <a:defRPr sz="1800" b="1"/>
-            </a:pPr>
             <a:r>
               <a:t>💡 VALEUR AJOUTÉE :</a:t>
             </a:r>
@@ -5880,7 +6037,7 @@
 </file>
 
 <file path=ppt/slides/slide29.xml><?xml version="1.0" encoding="utf-8"?>
-<p:sld xmlns:a="http://schemas.openxmlformats.org/drawingml/2006/main" xmlns:p="http://schemas.openxmlformats.org/presentationml/2006/main" xmlns:r="http://schemas.openxmlformats.org/officeDocument/2006/relationships">
+<p:sld xmlns:a="http://schemas.openxmlformats.org/drawingml/2006/main" xmlns:r="http://schemas.openxmlformats.org/officeDocument/2006/relationships" xmlns:p="http://schemas.openxmlformats.org/presentationml/2006/main">
   <p:cSld>
     <p:spTree>
       <p:nvGrpSpPr>
@@ -5888,7 +6045,14 @@
         <p:cNvGrpSpPr/>
         <p:nvPr/>
       </p:nvGrpSpPr>
-      <p:grpSpPr/>
+      <p:grpSpPr>
+        <a:xfrm>
+          <a:off x="0" y="0"/>
+          <a:ext cx="0" cy="0"/>
+          <a:chOff x="0" y="0"/>
+          <a:chExt cx="0" cy="0"/>
+        </a:xfrm>
+      </p:grpSpPr>
       <p:sp>
         <p:nvSpPr>
           <p:cNvPr id="2" name="Title 1"/>
@@ -5941,9 +6105,6 @@
           </a:p>
           <a:p>
             <a:br/>
-            <a:pPr lvl="1">
-              <a:defRPr sz="1600" b="1"/>
-            </a:pPr>
             <a:r>
               <a:t>Merci à notre encadrante pour :</a:t>
             </a:r>
@@ -5974,9 +6135,6 @@
           </a:p>
           <a:p>
             <a:br/>
-            <a:pPr lvl="1">
-              <a:defRPr sz="1600" b="1"/>
-            </a:pPr>
             <a:r>
               <a:t>📚 RESSOURCES :</a:t>
             </a:r>
@@ -6016,7 +6174,7 @@
 </file>
 
 <file path=ppt/slides/slide3.xml><?xml version="1.0" encoding="utf-8"?>
-<p:sld xmlns:a="http://schemas.openxmlformats.org/drawingml/2006/main" xmlns:p="http://schemas.openxmlformats.org/presentationml/2006/main" xmlns:r="http://schemas.openxmlformats.org/officeDocument/2006/relationships">
+<p:sld xmlns:a="http://schemas.openxmlformats.org/drawingml/2006/main" xmlns:r="http://schemas.openxmlformats.org/officeDocument/2006/relationships" xmlns:p="http://schemas.openxmlformats.org/presentationml/2006/main">
   <p:cSld>
     <p:spTree>
       <p:nvGrpSpPr>
@@ -6024,7 +6182,14 @@
         <p:cNvGrpSpPr/>
         <p:nvPr/>
       </p:nvGrpSpPr>
-      <p:grpSpPr/>
+      <p:grpSpPr>
+        <a:xfrm>
+          <a:off x="0" y="0"/>
+          <a:ext cx="0" cy="0"/>
+          <a:chOff x="0" y="0"/>
+          <a:chExt cx="0" cy="0"/>
+        </a:xfrm>
+      </p:grpSpPr>
       <p:sp>
         <p:nvSpPr>
           <p:cNvPr id="2" name="Title 1"/>
@@ -6192,7 +6357,7 @@
 </file>
 
 <file path=ppt/slides/slide30.xml><?xml version="1.0" encoding="utf-8"?>
-<p:sld xmlns:a="http://schemas.openxmlformats.org/drawingml/2006/main" xmlns:p="http://schemas.openxmlformats.org/presentationml/2006/main" xmlns:r="http://schemas.openxmlformats.org/officeDocument/2006/relationships">
+<p:sld xmlns:a="http://schemas.openxmlformats.org/drawingml/2006/main" xmlns:r="http://schemas.openxmlformats.org/officeDocument/2006/relationships" xmlns:p="http://schemas.openxmlformats.org/presentationml/2006/main">
   <p:cSld>
     <p:spTree>
       <p:nvGrpSpPr>
@@ -6200,7 +6365,14 @@
         <p:cNvGrpSpPr/>
         <p:nvPr/>
       </p:nvGrpSpPr>
-      <p:grpSpPr/>
+      <p:grpSpPr>
+        <a:xfrm>
+          <a:off x="0" y="0"/>
+          <a:ext cx="0" cy="0"/>
+          <a:chOff x="0" y="0"/>
+          <a:chExt cx="0" cy="0"/>
+        </a:xfrm>
+      </p:grpSpPr>
       <p:sp>
         <p:nvSpPr>
           <p:cNvPr id="2" name="Title 1"/>
@@ -6241,23 +6413,28 @@
         </p:nvSpPr>
         <p:spPr/>
         <p:txBody>
-          <a:bodyPr/>
+          <a:bodyPr>
+            <a:normAutofit/>
+          </a:bodyPr>
           <a:lstStyle/>
           <a:p>
             <a:pPr algn="ctr">
               <a:defRPr sz="2400" b="1"/>
             </a:pPr>
             <a:r>
+              <a:rPr dirty="0"/>
               <a:t>❓ QUESTIONS &amp; RÉPONSES</a:t>
             </a:r>
           </a:p>
           <a:p>
-            <a:br/>
-            <a:br/>
-            <a:pPr algn="ctr">
-              <a:defRPr sz="1800" b="1"/>
-            </a:pPr>
-            <a:r>
+            <a:br>
+              <a:rPr dirty="0"/>
+            </a:br>
+            <a:br>
+              <a:rPr dirty="0"/>
+            </a:br>
+            <a:r>
+              <a:rPr dirty="0"/>
               <a:t>Contact :</a:t>
             </a:r>
           </a:p>
@@ -6266,14 +6443,29 @@
               <a:defRPr sz="1600"/>
             </a:pPr>
             <a:r>
-              <a:t>Gémima ONDELE POURU</a:t>
-            </a:r>
+              <a:rPr dirty="0"/>
+              <a:t>Gémima ONDELE POUR</a:t>
+            </a:r>
+            <a:r>
+              <a:rPr lang="fr-FR" dirty="0"/>
+              <a:t>O</a:t>
+            </a:r>
+            <a:r>
+              <a:rPr dirty="0"/>
+              <a:t>U</a:t>
+            </a:r>
+            <a:r>
+              <a:rPr lang="fr-FR"/>
+              <a:t> </a:t>
+            </a:r>
+            <a:endParaRPr dirty="0"/>
           </a:p>
           <a:p>
             <a:pPr algn="ctr">
               <a:defRPr sz="1600"/>
             </a:pPr>
             <a:r>
+              <a:rPr dirty="0"/>
               <a:t>Fatoumata BAH</a:t>
             </a:r>
           </a:p>
@@ -6282,17 +6474,31 @@
               <a:defRPr sz="1600"/>
             </a:pPr>
             <a:r>
+              <a:rPr dirty="0"/>
               <a:t>Hector KOMBOU</a:t>
             </a:r>
           </a:p>
           <a:p>
-            <a:br/>
-            <a:pPr algn="ctr">
-              <a:defRPr sz="1400"/>
-            </a:pPr>
-            <a:r>
+            <a:br>
+              <a:rPr dirty="0"/>
+            </a:br>
+            <a:r>
+              <a:rPr dirty="0"/>
               <a:t>Code source : Disponible sur GitHub</a:t>
             </a:r>
+            <a:endParaRPr lang="fr-FR" dirty="0"/>
+          </a:p>
+          <a:p>
+            <a:r>
+              <a:rPr lang="fr-FR" sz="1600" dirty="0">
+                <a:hlinkClick r:id="rId2"/>
+              </a:rPr>
+              <a:t>https://github.com/GemimaOndele/Projet_moteur_de_recherche_de_films</a:t>
+            </a:r>
+            <a:endParaRPr lang="fr-FR" sz="1600" dirty="0"/>
+          </a:p>
+          <a:p>
+            <a:endParaRPr dirty="0"/>
           </a:p>
         </p:txBody>
       </p:sp>
@@ -6305,7 +6511,7 @@
 </file>
 
 <file path=ppt/slides/slide4.xml><?xml version="1.0" encoding="utf-8"?>
-<p:sld xmlns:a="http://schemas.openxmlformats.org/drawingml/2006/main" xmlns:p="http://schemas.openxmlformats.org/presentationml/2006/main" xmlns:r="http://schemas.openxmlformats.org/officeDocument/2006/relationships">
+<p:sld xmlns:a="http://schemas.openxmlformats.org/drawingml/2006/main" xmlns:r="http://schemas.openxmlformats.org/officeDocument/2006/relationships" xmlns:p="http://schemas.openxmlformats.org/presentationml/2006/main">
   <p:cSld>
     <p:spTree>
       <p:nvGrpSpPr>
@@ -6313,7 +6519,14 @@
         <p:cNvGrpSpPr/>
         <p:nvPr/>
       </p:nvGrpSpPr>
-      <p:grpSpPr/>
+      <p:grpSpPr>
+        <a:xfrm>
+          <a:off x="0" y="0"/>
+          <a:ext cx="0" cy="0"/>
+          <a:chOff x="0" y="0"/>
+          <a:chExt cx="0" cy="0"/>
+        </a:xfrm>
+      </p:grpSpPr>
       <p:sp>
         <p:nvSpPr>
           <p:cNvPr id="2" name="Title 1"/>
@@ -6354,7 +6567,9 @@
         </p:nvSpPr>
         <p:spPr/>
         <p:txBody>
-          <a:bodyPr/>
+          <a:bodyPr>
+            <a:normAutofit fontScale="85000" lnSpcReduction="20000"/>
+          </a:bodyPr>
           <a:lstStyle/>
           <a:p>
             <a:pPr>
@@ -6402,13 +6617,6 @@
           </a:p>
           <a:p>
             <a:br/>
-            <a:pPr>
-              <a:defRPr sz="1800" b="1">
-                <a:solidFill>
-                  <a:srgbClr val="E94560"/>
-                </a:solidFill>
-              </a:defRPr>
-            </a:pPr>
             <a:r>
               <a:t>Phase 2 - Moteur de Recherche</a:t>
             </a:r>
@@ -6455,13 +6663,6 @@
           </a:p>
           <a:p>
             <a:br/>
-            <a:pPr>
-              <a:defRPr sz="1800" b="1">
-                <a:solidFill>
-                  <a:srgbClr val="E94560"/>
-                </a:solidFill>
-              </a:defRPr>
-            </a:pPr>
             <a:r>
               <a:t>Phase 3 - Interface Web</a:t>
             </a:r>
@@ -6517,7 +6718,7 @@
 </file>
 
 <file path=ppt/slides/slide5.xml><?xml version="1.0" encoding="utf-8"?>
-<p:sld xmlns:a="http://schemas.openxmlformats.org/drawingml/2006/main" xmlns:p="http://schemas.openxmlformats.org/presentationml/2006/main" xmlns:r="http://schemas.openxmlformats.org/officeDocument/2006/relationships">
+<p:sld xmlns:a="http://schemas.openxmlformats.org/drawingml/2006/main" xmlns:r="http://schemas.openxmlformats.org/officeDocument/2006/relationships" xmlns:p="http://schemas.openxmlformats.org/presentationml/2006/main">
   <p:cSld>
     <p:spTree>
       <p:nvGrpSpPr>
@@ -6525,7 +6726,14 @@
         <p:cNvGrpSpPr/>
         <p:nvPr/>
       </p:nvGrpSpPr>
-      <p:grpSpPr/>
+      <p:grpSpPr>
+        <a:xfrm>
+          <a:off x="0" y="0"/>
+          <a:ext cx="0" cy="0"/>
+          <a:chOff x="0" y="0"/>
+          <a:chExt cx="0" cy="0"/>
+        </a:xfrm>
+      </p:grpSpPr>
       <p:sp>
         <p:nvSpPr>
           <p:cNvPr id="2" name="Title 1"/>
@@ -6590,9 +6798,6 @@
           </a:p>
           <a:p>
             <a:br/>
-            <a:pPr>
-              <a:defRPr sz="1600" b="1"/>
-            </a:pPr>
             <a:r>
               <a:t>💡 RÉPONSE DE L'IA :</a:t>
             </a:r>
@@ -6639,9 +6844,6 @@
           </a:p>
           <a:p>
             <a:br/>
-            <a:pPr lvl="1">
-              <a:defRPr sz="1400"/>
-            </a:pPr>
             <a:r>
               <a:t>✅ Plan de travail avec répartition des tâches</a:t>
             </a:r>
@@ -6665,7 +6867,7 @@
 </file>
 
 <file path=ppt/slides/slide6.xml><?xml version="1.0" encoding="utf-8"?>
-<p:sld xmlns:a="http://schemas.openxmlformats.org/drawingml/2006/main" xmlns:p="http://schemas.openxmlformats.org/presentationml/2006/main" xmlns:r="http://schemas.openxmlformats.org/officeDocument/2006/relationships">
+<p:sld xmlns:a="http://schemas.openxmlformats.org/drawingml/2006/main" xmlns:r="http://schemas.openxmlformats.org/officeDocument/2006/relationships" xmlns:p="http://schemas.openxmlformats.org/presentationml/2006/main">
   <p:cSld>
     <p:spTree>
       <p:nvGrpSpPr>
@@ -6673,7 +6875,14 @@
         <p:cNvGrpSpPr/>
         <p:nvPr/>
       </p:nvGrpSpPr>
-      <p:grpSpPr/>
+      <p:grpSpPr>
+        <a:xfrm>
+          <a:off x="0" y="0"/>
+          <a:ext cx="0" cy="0"/>
+          <a:chOff x="0" y="0"/>
+          <a:chExt cx="0" cy="0"/>
+        </a:xfrm>
+      </p:grpSpPr>
       <p:sp>
         <p:nvSpPr>
           <p:cNvPr id="2" name="Title 1"/>
@@ -6818,7 +7027,7 @@
 </file>
 
 <file path=ppt/slides/slide7.xml><?xml version="1.0" encoding="utf-8"?>
-<p:sld xmlns:a="http://schemas.openxmlformats.org/drawingml/2006/main" xmlns:p="http://schemas.openxmlformats.org/presentationml/2006/main" xmlns:r="http://schemas.openxmlformats.org/officeDocument/2006/relationships">
+<p:sld xmlns:a="http://schemas.openxmlformats.org/drawingml/2006/main" xmlns:r="http://schemas.openxmlformats.org/officeDocument/2006/relationships" xmlns:p="http://schemas.openxmlformats.org/presentationml/2006/main">
   <p:cSld>
     <p:spTree>
       <p:nvGrpSpPr>
@@ -6826,7 +7035,14 @@
         <p:cNvGrpSpPr/>
         <p:nvPr/>
       </p:nvGrpSpPr>
-      <p:grpSpPr/>
+      <p:grpSpPr>
+        <a:xfrm>
+          <a:off x="0" y="0"/>
+          <a:ext cx="0" cy="0"/>
+          <a:chOff x="0" y="0"/>
+          <a:chExt cx="0" cy="0"/>
+        </a:xfrm>
+      </p:grpSpPr>
       <p:sp>
         <p:nvSpPr>
           <p:cNvPr id="2" name="Title 1"/>
@@ -6887,9 +7103,6 @@
           </a:p>
           <a:p>
             <a:br/>
-            <a:pPr>
-              <a:defRPr sz="1600" b="1"/>
-            </a:pPr>
             <a:r>
               <a:t>💡 RÉPONSE :</a:t>
             </a:r>
@@ -6929,7 +7142,7 @@
 </file>
 
 <file path=ppt/slides/slide8.xml><?xml version="1.0" encoding="utf-8"?>
-<p:sld xmlns:a="http://schemas.openxmlformats.org/drawingml/2006/main" xmlns:p="http://schemas.openxmlformats.org/presentationml/2006/main" xmlns:r="http://schemas.openxmlformats.org/officeDocument/2006/relationships">
+<p:sld xmlns:a="http://schemas.openxmlformats.org/drawingml/2006/main" xmlns:r="http://schemas.openxmlformats.org/officeDocument/2006/relationships" xmlns:p="http://schemas.openxmlformats.org/presentationml/2006/main">
   <p:cSld>
     <p:spTree>
       <p:nvGrpSpPr>
@@ -6937,7 +7150,14 @@
         <p:cNvGrpSpPr/>
         <p:nvPr/>
       </p:nvGrpSpPr>
-      <p:grpSpPr/>
+      <p:grpSpPr>
+        <a:xfrm>
+          <a:off x="0" y="0"/>
+          <a:ext cx="0" cy="0"/>
+          <a:chOff x="0" y="0"/>
+          <a:chExt cx="0" cy="0"/>
+        </a:xfrm>
+      </p:grpSpPr>
       <p:sp>
         <p:nvSpPr>
           <p:cNvPr id="2" name="Title 1"/>
@@ -6950,7 +7170,9 @@
         </p:nvSpPr>
         <p:spPr/>
         <p:txBody>
-          <a:bodyPr/>
+          <a:bodyPr>
+            <a:normAutofit fontScale="90000"/>
+          </a:bodyPr>
           <a:lstStyle/>
           <a:p>
             <a:pPr>
@@ -7066,7 +7288,7 @@
 </file>
 
 <file path=ppt/slides/slide9.xml><?xml version="1.0" encoding="utf-8"?>
-<p:sld xmlns:a="http://schemas.openxmlformats.org/drawingml/2006/main" xmlns:p="http://schemas.openxmlformats.org/presentationml/2006/main" xmlns:r="http://schemas.openxmlformats.org/officeDocument/2006/relationships">
+<p:sld xmlns:a="http://schemas.openxmlformats.org/drawingml/2006/main" xmlns:r="http://schemas.openxmlformats.org/officeDocument/2006/relationships" xmlns:p="http://schemas.openxmlformats.org/presentationml/2006/main">
   <p:cSld>
     <p:spTree>
       <p:nvGrpSpPr>
@@ -7074,7 +7296,14 @@
         <p:cNvGrpSpPr/>
         <p:nvPr/>
       </p:nvGrpSpPr>
-      <p:grpSpPr/>
+      <p:grpSpPr>
+        <a:xfrm>
+          <a:off x="0" y="0"/>
+          <a:ext cx="0" cy="0"/>
+          <a:chOff x="0" y="0"/>
+          <a:chExt cx="0" cy="0"/>
+        </a:xfrm>
+      </p:grpSpPr>
       <p:sp>
         <p:nvSpPr>
           <p:cNvPr id="2" name="Title 1"/>
@@ -7135,9 +7364,6 @@
           </a:p>
           <a:p>
             <a:br/>
-            <a:pPr>
-              <a:defRPr sz="1600" b="1"/>
-            </a:pPr>
             <a:r>
               <a:t>💡 RÉPONSE :</a:t>
             </a:r>

</xml_diff>